<commit_message>
re-adding files git issue
</commit_message>
<xml_diff>
--- a/python1_2025.pptx
+++ b/python1_2025.pptx
@@ -9547,8 +9547,8 @@
         </p:nvSpPr>
         <p:spPr>
           <a:xfrm>
-            <a:off x="3060180" y="4150581"/>
-            <a:ext cx="5429700" cy="824839"/>
+            <a:off x="5159828" y="4150581"/>
+            <a:ext cx="3330051" cy="824839"/>
           </a:xfrm>
           <a:prstGeom prst="rect">
             <a:avLst/>
@@ -9690,6 +9690,75 @@
           </a:extLst>
         </p:spPr>
       </p:pic>
+      <p:sp>
+        <p:nvSpPr>
+          <p:cNvPr id="3" name="TextBox 2">
+            <a:extLst>
+              <a:ext uri="{FF2B5EF4-FFF2-40B4-BE49-F238E27FC236}">
+                <a16:creationId xmlns:a16="http://schemas.microsoft.com/office/drawing/2014/main" id="{4D2B50C0-777A-B3CF-EBA0-DE018E0F98C2}"/>
+              </a:ext>
+            </a:extLst>
+          </p:cNvPr>
+          <p:cNvSpPr txBox="1"/>
+          <p:nvPr/>
+        </p:nvSpPr>
+        <p:spPr>
+          <a:xfrm>
+            <a:off x="1558033" y="4452200"/>
+            <a:ext cx="3013967" cy="523220"/>
+          </a:xfrm>
+          <a:prstGeom prst="rect">
+            <a:avLst/>
+          </a:prstGeom>
+          <a:noFill/>
+        </p:spPr>
+        <p:txBody>
+          <a:bodyPr wrap="none" rtlCol="0">
+            <a:spAutoFit/>
+          </a:bodyPr>
+          <a:lstStyle/>
+          <a:p>
+            <a:r>
+              <a:rPr lang="en-US" dirty="0">
+                <a:solidFill>
+                  <a:schemeClr val="tx1"/>
+                </a:solidFill>
+                <a:latin typeface="Avenir Book" panose="02000503020000020003" pitchFamily="2" charset="0"/>
+              </a:rPr>
+              <a:t>Course Material:</a:t>
+            </a:r>
+          </a:p>
+          <a:p>
+            <a:r>
+              <a:rPr lang="en-US" dirty="0">
+                <a:solidFill>
+                  <a:schemeClr val="tx1"/>
+                </a:solidFill>
+                <a:latin typeface="Avenir Book" panose="02000503020000020003" pitchFamily="2" charset="0"/>
+              </a:rPr>
+              <a:t>https://</a:t>
+            </a:r>
+            <a:r>
+              <a:rPr lang="en-US" dirty="0" err="1">
+                <a:solidFill>
+                  <a:schemeClr val="tx1"/>
+                </a:solidFill>
+                <a:latin typeface="Avenir Book" panose="02000503020000020003" pitchFamily="2" charset="0"/>
+              </a:rPr>
+              <a:t>github.com</a:t>
+            </a:r>
+            <a:r>
+              <a:rPr lang="en-US" dirty="0">
+                <a:solidFill>
+                  <a:schemeClr val="tx1"/>
+                </a:solidFill>
+                <a:latin typeface="Avenir Book" panose="02000503020000020003" pitchFamily="2" charset="0"/>
+              </a:rPr>
+              <a:t>/CWML/Python1</a:t>
+            </a:r>
+          </a:p>
+        </p:txBody>
+      </p:sp>
     </p:spTree>
   </p:cSld>
   <p:clrMapOvr>

</xml_diff>